<commit_message>
Fix typo in ai/6.1 slide
Signed-off-by: Juan Carlos Perez Castellanos <cuyopc@gmail.com>
</commit_message>
<xml_diff>
--- a/ai/6.1.pptx
+++ b/ai/6.1.pptx
@@ -13218,7 +13218,7 @@
                 <a:cs typeface="Arial" charset="0"/>
                 <a:sym typeface="Cabin"/>
               </a:rPr>
-              <a:t>Se dejamos en blanco el primer o el último número de la rebanada, se asume que es el inicio o el final de la cadena, respectivamente</a:t>
+              <a:t>Si dejamos en blanco el primer o el último número de la rebanada, se asume que es el inicio o el final de la cadena, respectivamente</a:t>
             </a:r>
           </a:p>
         </p:txBody>
@@ -19795,7 +19795,7 @@
               <a:buNone/>
             </a:pPr>
             <a:r>
-              <a:rPr lang="es-MX" sz="7600" u="none" strike="noStrike" cap="none">
+              <a:rPr lang="es-MX" sz="7600" u="none" strike="noStrike" cap="none" dirty="0">
                 <a:solidFill>
                   <a:srgbClr val="FFFF00"/>
                 </a:solidFill>
@@ -20644,7 +20644,7 @@
               <a:buNone/>
             </a:pPr>
             <a:r>
-              <a:rPr lang="es-MX" sz="3600" b="0" u="none" strike="noStrike" cap="none">
+              <a:rPr lang="es-MX" sz="3600" b="0" u="none" strike="noStrike" cap="none" dirty="0">
                 <a:solidFill>
                   <a:schemeClr val="lt1"/>
                 </a:solidFill>
@@ -20656,7 +20656,7 @@
               <a:t>La función nativa </a:t>
             </a:r>
             <a:r>
-              <a:rPr lang="es-MX" sz="3600" b="0" u="none" strike="noStrike" cap="none">
+              <a:rPr lang="es-MX" sz="3600" b="0" u="none" strike="noStrike" cap="none" dirty="0" err="1">
                 <a:solidFill>
                   <a:srgbClr val="FF00FF"/>
                 </a:solidFill>
@@ -20668,7 +20668,7 @@
               <a:t>len</a:t>
             </a:r>
             <a:r>
-              <a:rPr lang="es-MX" sz="3600" b="0" u="none" strike="noStrike" cap="none">
+              <a:rPr lang="es-MX" sz="3600" b="0" u="none" strike="noStrike" cap="none" dirty="0">
                 <a:solidFill>
                   <a:schemeClr val="lt1"/>
                 </a:solidFill>

</xml_diff>